<commit_message>
add 004 and prepare
</commit_message>
<xml_diff>
--- a/Introducing_RE/Introducing_RE.pptx
+++ b/Introducing_RE/Introducing_RE.pptx
@@ -9407,31 +9407,104 @@
           </a:effectLst>
         </p:spPr>
       </p:pic>
-      <p:sp>
-        <p:nvSpPr>
-          <p:cNvPr id="5" name="Content Placeholder 4">
+      <p:pic>
+        <p:nvPicPr>
+          <p:cNvPr id="6" name="Content Placeholder 5">
             <a:extLst>
               <a:ext uri="{FF2B5EF4-FFF2-40B4-BE49-F238E27FC236}">
-                <a16:creationId xmlns:a16="http://schemas.microsoft.com/office/drawing/2014/main" id="{8112F1EE-3C22-5A0E-69D0-585D1BAA0AAE}"/>
+                <a16:creationId xmlns:a16="http://schemas.microsoft.com/office/drawing/2014/main" id="{0536AC7A-E4B3-DD58-C802-C95D0B9AD015}"/>
               </a:ext>
             </a:extLst>
           </p:cNvPr>
-          <p:cNvSpPr>
-            <a:spLocks noGrp="1"/>
-          </p:cNvSpPr>
+          <p:cNvPicPr>
+            <a:picLocks noGrp="1" noChangeAspect="1"/>
+          </p:cNvPicPr>
           <p:nvPr>
             <p:ph idx="1"/>
           </p:nvPr>
-        </p:nvSpPr>
-        <p:spPr/>
-        <p:txBody>
-          <a:bodyPr/>
-          <a:lstStyle/>
-          <a:p>
-            <a:endParaRPr lang="en-US"/>
-          </a:p>
-        </p:txBody>
-      </p:sp>
+        </p:nvPicPr>
+        <p:blipFill>
+          <a:blip r:embed="rId4"/>
+          <a:stretch>
+            <a:fillRect/>
+          </a:stretch>
+        </p:blipFill>
+        <p:spPr>
+          <a:xfrm>
+            <a:off x="1910993" y="1248767"/>
+            <a:ext cx="6626832" cy="5441828"/>
+          </a:xfrm>
+          <a:prstGeom prst="rect">
+            <a:avLst/>
+          </a:prstGeom>
+          <a:ln>
+            <a:noFill/>
+          </a:ln>
+          <a:effectLst>
+            <a:outerShdw blurRad="292100" dist="139700" dir="2700000" algn="tl" rotWithShape="0">
+              <a:srgbClr val="333333">
+                <a:alpha val="65000"/>
+              </a:srgbClr>
+            </a:outerShdw>
+          </a:effectLst>
+        </p:spPr>
+      </p:pic>
+      <p:pic>
+        <p:nvPicPr>
+          <p:cNvPr id="1026" name="Picture 2" descr="Regex basics">
+            <a:extLst>
+              <a:ext uri="{FF2B5EF4-FFF2-40B4-BE49-F238E27FC236}">
+                <a16:creationId xmlns:a16="http://schemas.microsoft.com/office/drawing/2014/main" id="{EA9AE496-027A-0719-6760-AD49BF0492DB}"/>
+              </a:ext>
+            </a:extLst>
+          </p:cNvPr>
+          <p:cNvPicPr>
+            <a:picLocks noChangeAspect="1" noChangeArrowheads="1"/>
+          </p:cNvPicPr>
+          <p:nvPr/>
+        </p:nvPicPr>
+        <p:blipFill>
+          <a:blip r:embed="rId5">
+            <a:extLst>
+              <a:ext uri="{28A0092B-C50C-407E-A947-70E740481C1C}">
+                <a14:useLocalDpi xmlns:a14="http://schemas.microsoft.com/office/drawing/2010/main" val="0"/>
+              </a:ext>
+            </a:extLst>
+          </a:blip>
+          <a:srcRect/>
+          <a:stretch>
+            <a:fillRect/>
+          </a:stretch>
+        </p:blipFill>
+        <p:spPr bwMode="auto">
+          <a:xfrm>
+            <a:off x="7594570" y="2962846"/>
+            <a:ext cx="3748100" cy="3675220"/>
+          </a:xfrm>
+          <a:prstGeom prst="rect">
+            <a:avLst/>
+          </a:prstGeom>
+          <a:ln>
+            <a:noFill/>
+          </a:ln>
+          <a:effectLst>
+            <a:outerShdw blurRad="190500" algn="tl" rotWithShape="0">
+              <a:srgbClr val="000000">
+                <a:alpha val="70000"/>
+              </a:srgbClr>
+            </a:outerShdw>
+          </a:effectLst>
+          <a:extLst>
+            <a:ext uri="{909E8E84-426E-40DD-AFC4-6F175D3DCCD1}">
+              <a14:hiddenFill xmlns:a14="http://schemas.microsoft.com/office/drawing/2010/main">
+                <a:solidFill>
+                  <a:srgbClr val="FFFFFF"/>
+                </a:solidFill>
+              </a14:hiddenFill>
+            </a:ext>
+          </a:extLst>
+        </p:spPr>
+      </p:pic>
     </p:spTree>
     <p:extLst>
       <p:ext uri="{BB962C8B-B14F-4D97-AF65-F5344CB8AC3E}">

</xml_diff>